<commit_message>
Criação do projeto no maven e configuração do arquivo pom.xml
</commit_message>
<xml_diff>
--- a/Evidências/Servidor Gitlab/Servidor Gitlab.pptx
+++ b/Evidências/Servidor Gitlab/Servidor Gitlab.pptx
@@ -5,10 +5,10 @@
     <p:sldMasterId id="2147483660" r:id="rId4"/>
   </p:sldMasterIdLst>
   <p:notesMasterIdLst>
-    <p:notesMasterId r:id="rId12"/>
+    <p:notesMasterId r:id="rId13"/>
   </p:notesMasterIdLst>
   <p:handoutMasterIdLst>
-    <p:handoutMasterId r:id="rId13"/>
+    <p:handoutMasterId r:id="rId14"/>
   </p:handoutMasterIdLst>
   <p:sldIdLst>
     <p:sldId id="346" r:id="rId5"/>
@@ -17,7 +17,8 @@
     <p:sldId id="347" r:id="rId8"/>
     <p:sldId id="348" r:id="rId9"/>
     <p:sldId id="349" r:id="rId10"/>
-    <p:sldId id="268" r:id="rId11"/>
+    <p:sldId id="350" r:id="rId11"/>
+    <p:sldId id="268" r:id="rId12"/>
   </p:sldIdLst>
   <p:sldSz cx="9144000" cy="5143500" type="screen16x9"/>
   <p:notesSz cx="6858000" cy="9144000"/>
@@ -5544,6 +5545,119 @@
 </file>
 
 <file path=ppt/slides/slide7.xml><?xml version="1.0" encoding="utf-8"?>
+<p:sld xmlns:a="http://schemas.openxmlformats.org/drawingml/2006/main" xmlns:r="http://schemas.openxmlformats.org/officeDocument/2006/relationships" xmlns:p="http://schemas.openxmlformats.org/presentationml/2006/main">
+  <p:cSld>
+    <p:spTree>
+      <p:nvGrpSpPr>
+        <p:cNvPr id="1" name=""/>
+        <p:cNvGrpSpPr/>
+        <p:nvPr/>
+      </p:nvGrpSpPr>
+      <p:grpSpPr>
+        <a:xfrm>
+          <a:off x="0" y="0"/>
+          <a:ext cx="0" cy="0"/>
+          <a:chOff x="0" y="0"/>
+          <a:chExt cx="0" cy="0"/>
+        </a:xfrm>
+      </p:grpSpPr>
+      <p:sp>
+        <p:nvSpPr>
+          <p:cNvPr id="2" name="Título 1">
+            <a:extLst>
+              <a:ext uri="{FF2B5EF4-FFF2-40B4-BE49-F238E27FC236}">
+                <a16:creationId xmlns:a16="http://schemas.microsoft.com/office/drawing/2014/main" id="{53BE87A3-9E54-6873-0BFB-B63B3B63B6EC}"/>
+              </a:ext>
+            </a:extLst>
+          </p:cNvPr>
+          <p:cNvSpPr>
+            <a:spLocks noGrp="1"/>
+          </p:cNvSpPr>
+          <p:nvPr>
+            <p:ph type="title"/>
+          </p:nvPr>
+        </p:nvSpPr>
+        <p:spPr/>
+        <p:txBody>
+          <a:bodyPr/>
+          <a:lstStyle/>
+          <a:p>
+            <a:endParaRPr lang="pt-BR"/>
+          </a:p>
+        </p:txBody>
+      </p:sp>
+      <p:sp>
+        <p:nvSpPr>
+          <p:cNvPr id="3" name="Marcador de Posição do Texto 2">
+            <a:extLst>
+              <a:ext uri="{FF2B5EF4-FFF2-40B4-BE49-F238E27FC236}">
+                <a16:creationId xmlns:a16="http://schemas.microsoft.com/office/drawing/2014/main" id="{758EAFAB-B585-4CE4-1110-62AA8F9F48FC}"/>
+              </a:ext>
+            </a:extLst>
+          </p:cNvPr>
+          <p:cNvSpPr>
+            <a:spLocks noGrp="1"/>
+          </p:cNvSpPr>
+          <p:nvPr>
+            <p:ph type="body" sz="quarter" idx="11"/>
+          </p:nvPr>
+        </p:nvSpPr>
+        <p:spPr/>
+        <p:txBody>
+          <a:bodyPr/>
+          <a:lstStyle/>
+          <a:p>
+            <a:endParaRPr lang="pt-BR"/>
+          </a:p>
+        </p:txBody>
+      </p:sp>
+      <p:pic>
+        <p:nvPicPr>
+          <p:cNvPr id="5" name="Imagem 4">
+            <a:extLst>
+              <a:ext uri="{FF2B5EF4-FFF2-40B4-BE49-F238E27FC236}">
+                <a16:creationId xmlns:a16="http://schemas.microsoft.com/office/drawing/2014/main" id="{DDC24219-DFBD-15C8-B658-23A3914BE4DF}"/>
+              </a:ext>
+            </a:extLst>
+          </p:cNvPr>
+          <p:cNvPicPr>
+            <a:picLocks noChangeAspect="1"/>
+          </p:cNvPicPr>
+          <p:nvPr/>
+        </p:nvPicPr>
+        <p:blipFill>
+          <a:blip r:embed="rId2"/>
+          <a:stretch>
+            <a:fillRect/>
+          </a:stretch>
+        </p:blipFill>
+        <p:spPr>
+          <a:xfrm>
+            <a:off x="140047" y="209772"/>
+            <a:ext cx="8647106" cy="4608414"/>
+          </a:xfrm>
+          <a:prstGeom prst="rect">
+            <a:avLst/>
+          </a:prstGeom>
+        </p:spPr>
+      </p:pic>
+    </p:spTree>
+    <p:extLst>
+      <p:ext uri="{BB962C8B-B14F-4D97-AF65-F5344CB8AC3E}">
+        <p14:creationId xmlns:p14="http://schemas.microsoft.com/office/powerpoint/2010/main" val="4008362237"/>
+      </p:ext>
+    </p:extLst>
+  </p:cSld>
+  <p:clrMapOvr>
+    <a:masterClrMapping/>
+  </p:clrMapOvr>
+  <p:transition>
+    <p:fade/>
+  </p:transition>
+</p:sld>
+</file>
+
+<file path=ppt/slides/slide8.xml><?xml version="1.0" encoding="utf-8"?>
 <p:sld xmlns:a="http://schemas.openxmlformats.org/drawingml/2006/main" xmlns:r="http://schemas.openxmlformats.org/officeDocument/2006/relationships" xmlns:p="http://schemas.openxmlformats.org/presentationml/2006/main">
   <p:cSld>
     <p:spTree>
@@ -6700,18 +6814,18 @@
 </file>
 
 <file path=customXml/item1.xml><?xml version="1.0" encoding="utf-8"?>
-<p:properties xmlns:p="http://schemas.microsoft.com/office/2006/metadata/properties" xmlns:xsi="http://www.w3.org/2001/XMLSchema-instance" xmlns:pc="http://schemas.microsoft.com/office/infopath/2007/PartnerControls">
-  <documentManagement/>
-</p:properties>
-</file>
-
-<file path=customXml/item2.xml><?xml version="1.0" encoding="utf-8"?>
 <?mso-contentType ?>
 <FormTemplates xmlns="http://schemas.microsoft.com/sharepoint/v3/contenttype/forms">
   <Display>DocumentLibraryForm</Display>
   <Edit>DocumentLibraryForm</Edit>
   <New>DocumentLibraryForm</New>
 </FormTemplates>
+</file>
+
+<file path=customXml/item2.xml><?xml version="1.0" encoding="utf-8"?>
+<p:properties xmlns:p="http://schemas.microsoft.com/office/2006/metadata/properties" xmlns:xsi="http://www.w3.org/2001/XMLSchema-instance" xmlns:pc="http://schemas.microsoft.com/office/infopath/2007/PartnerControls">
+  <documentManagement/>
+</p:properties>
 </file>
 
 <file path=customXml/item3.xml><?xml version="1.0" encoding="utf-8"?>
@@ -6938,6 +7052,14 @@
 </file>
 
 <file path=customXml/itemProps1.xml><?xml version="1.0" encoding="utf-8"?>
+<ds:datastoreItem xmlns:ds="http://schemas.openxmlformats.org/officeDocument/2006/customXml" ds:itemID="{570EC5F2-088E-41B9-A12F-2C72B56359AD}">
+  <ds:schemaRefs>
+    <ds:schemaRef ds:uri="http://schemas.microsoft.com/sharepoint/v3/contenttype/forms"/>
+  </ds:schemaRefs>
+</ds:datastoreItem>
+</file>
+
+<file path=customXml/itemProps2.xml><?xml version="1.0" encoding="utf-8"?>
 <ds:datastoreItem xmlns:ds="http://schemas.openxmlformats.org/officeDocument/2006/customXml" ds:itemID="{175F1917-3AC5-441B-BEAD-AA1C5F289112}">
   <ds:schemaRefs>
     <ds:schemaRef ds:uri="http://schemas.microsoft.com/office/infopath/2007/PartnerControls"/>
@@ -6950,14 +7072,6 @@
     <ds:schemaRef ds:uri="87964a91-b32e-490d-8e48-f9696f6aed8d"/>
     <ds:schemaRef ds:uri="http://www.w3.org/XML/1998/namespace"/>
     <ds:schemaRef ds:uri="http://purl.org/dc/dcmitype/"/>
-  </ds:schemaRefs>
-</ds:datastoreItem>
-</file>
-
-<file path=customXml/itemProps2.xml><?xml version="1.0" encoding="utf-8"?>
-<ds:datastoreItem xmlns:ds="http://schemas.openxmlformats.org/officeDocument/2006/customXml" ds:itemID="{570EC5F2-088E-41B9-A12F-2C72B56359AD}">
-  <ds:schemaRefs>
-    <ds:schemaRef ds:uri="http://schemas.microsoft.com/sharepoint/v3/contenttype/forms"/>
   </ds:schemaRefs>
 </ds:datastoreItem>
 </file>

</xml_diff>